<commit_message>
Fixed High Risk Project Presentation
</commit_message>
<xml_diff>
--- a/High_Risk_Project/High_Risk_Project.pptx
+++ b/High_Risk_Project/High_Risk_Project.pptx
@@ -16881,7 +16881,7 @@
           <a:p>
             <a:fld id="{93793916-1FCB-3348-835F-DDDE9C8CF44B}" type="datetimeFigureOut">
               <a:rPr lang="en-US" smtClean="0"/>
-              <a:t>4/19/25</a:t>
+              <a:t>4/22/25</a:t>
             </a:fld>
             <a:endParaRPr lang="en-US"/>
           </a:p>
@@ -18129,7 +18129,7 @@
           <a:p>
             <a:fld id="{C128FA71-3A18-48C0-980F-4B68F7F63042}" type="datetime1">
               <a:rPr lang="en-US" smtClean="0"/>
-              <a:t>4/19/25</a:t>
+              <a:t>4/22/25</a:t>
             </a:fld>
             <a:endParaRPr lang="en-US"/>
           </a:p>
@@ -18337,7 +18337,7 @@
           <a:p>
             <a:fld id="{7104EDB3-C0E8-45F8-9E1D-1B6C8D1880C0}" type="datetime1">
               <a:rPr lang="en-US" smtClean="0"/>
-              <a:t>4/19/25</a:t>
+              <a:t>4/22/25</a:t>
             </a:fld>
             <a:endParaRPr lang="en-US"/>
           </a:p>
@@ -18547,7 +18547,7 @@
           <a:p>
             <a:fld id="{9CF0EC4B-54ED-4041-B552-9BA760FA3DBA}" type="datetime1">
               <a:rPr lang="en-US" smtClean="0"/>
-              <a:t>4/19/25</a:t>
+              <a:t>4/22/25</a:t>
             </a:fld>
             <a:endParaRPr lang="en-US"/>
           </a:p>
@@ -18745,7 +18745,7 @@
           <a:p>
             <a:fld id="{51C1210E-201E-4473-82AC-2466F5386C38}" type="datetime1">
               <a:rPr lang="en-US" smtClean="0"/>
-              <a:t>4/19/25</a:t>
+              <a:t>4/22/25</a:t>
             </a:fld>
             <a:endParaRPr lang="en-US"/>
           </a:p>
@@ -19023,7 +19023,7 @@
           <a:p>
             <a:fld id="{B01EA198-6CAB-4B8F-B93F-1F9C8C4B6CE7}" type="datetime1">
               <a:rPr lang="en-US" smtClean="0"/>
-              <a:t>4/19/25</a:t>
+              <a:t>4/22/25</a:t>
             </a:fld>
             <a:endParaRPr lang="en-US"/>
           </a:p>
@@ -19295,7 +19295,7 @@
           <a:p>
             <a:fld id="{CA06041F-4525-44D5-AA4F-332294BF1F56}" type="datetime1">
               <a:rPr lang="en-US" smtClean="0"/>
-              <a:t>4/19/25</a:t>
+              <a:t>4/22/25</a:t>
             </a:fld>
             <a:endParaRPr lang="en-US"/>
           </a:p>
@@ -19719,7 +19719,7 @@
           <a:p>
             <a:fld id="{F9557091-BBDF-4EB9-BA6B-2BB67AC4FC0F}" type="datetime1">
               <a:rPr lang="en-US" smtClean="0"/>
-              <a:t>4/19/25</a:t>
+              <a:t>4/22/25</a:t>
             </a:fld>
             <a:endParaRPr lang="en-US"/>
           </a:p>
@@ -19860,7 +19860,7 @@
           <a:p>
             <a:fld id="{2D6B226B-77A6-410C-9796-083F278E0125}" type="datetime1">
               <a:rPr lang="en-US" smtClean="0"/>
-              <a:t>4/19/25</a:t>
+              <a:t>4/22/25</a:t>
             </a:fld>
             <a:endParaRPr lang="en-US"/>
           </a:p>
@@ -19973,7 +19973,7 @@
           <a:p>
             <a:fld id="{A23A578B-D289-4C40-8593-3D356C49DA58}" type="datetime1">
               <a:rPr lang="en-US" smtClean="0"/>
-              <a:t>4/19/25</a:t>
+              <a:t>4/22/25</a:t>
             </a:fld>
             <a:endParaRPr lang="en-US"/>
           </a:p>
@@ -20292,7 +20292,7 @@
           <a:p>
             <a:fld id="{713DFAE3-14DB-48A7-A80F-80DDB072CE3D}" type="datetime1">
               <a:rPr lang="en-US" smtClean="0"/>
-              <a:t>4/19/25</a:t>
+              <a:t>4/22/25</a:t>
             </a:fld>
             <a:endParaRPr lang="en-US"/>
           </a:p>
@@ -20586,7 +20586,7 @@
           <a:p>
             <a:fld id="{92C5EAEF-6478-4102-8F5D-A5FE9FC97ACB}" type="datetime1">
               <a:rPr lang="en-US" smtClean="0"/>
-              <a:t>4/19/25</a:t>
+              <a:t>4/22/25</a:t>
             </a:fld>
             <a:endParaRPr lang="en-US"/>
           </a:p>
@@ -20827,7 +20827,7 @@
           <a:p>
             <a:fld id="{67F45AC6-C491-4585-A584-9CE2AF7D5500}" type="datetime1">
               <a:rPr lang="en-US" smtClean="0"/>
-              <a:t>4/19/25</a:t>
+              <a:t>4/22/25</a:t>
             </a:fld>
             <a:endParaRPr lang="en-US"/>
           </a:p>
@@ -21371,7 +21371,22 @@
             </a:pPr>
             <a:r>
               <a:rPr lang="en-US" dirty="0"/>
-              <a:t>UT Austin in Healthcare</a:t>
+              <a:t>UT Austin</a:t>
+            </a:r>
+          </a:p>
+          <a:p>
+            <a:pPr algn="l">
+              <a:lnSpc>
+                <a:spcPct val="100000"/>
+              </a:lnSpc>
+            </a:pPr>
+            <a:r>
+              <a:rPr lang="en-US"/>
+              <a:t>AI </a:t>
+            </a:r>
+            <a:r>
+              <a:rPr lang="en-US" dirty="0"/>
+              <a:t>in Healthcare</a:t>
             </a:r>
           </a:p>
         </p:txBody>

</xml_diff>